<commit_message>
worked on theoretical documentation part
</commit_message>
<xml_diff>
--- a/sbr-documentation/scetches.pptx
+++ b/sbr-documentation/scetches.pptx
@@ -104,6 +104,11 @@
       </a:defRPr>
     </a:lvl9pPr>
   </p:defaultTextStyle>
+  <p:extLst>
+    <p:ext uri="{EFAFB233-063F-42B5-8137-9DF3F51BA10A}">
+      <p15:sldGuideLst xmlns:p15="http://schemas.microsoft.com/office/powerpoint/2012/main"/>
+    </p:ext>
+  </p:extLst>
 </p:presentation>
 </file>
 
@@ -258,7 +263,7 @@
           <a:p>
             <a:fld id="{E27941F9-11D3-4E61-B86E-195AAB369534}" type="datetimeFigureOut">
               <a:rPr lang="en-US" smtClean="0"/>
-              <a:t>02/12/2017</a:t>
+              <a:t>04/12/2017</a:t>
             </a:fld>
             <a:endParaRPr lang="en-US"/>
           </a:p>
@@ -456,7 +461,7 @@
           <a:p>
             <a:fld id="{E27941F9-11D3-4E61-B86E-195AAB369534}" type="datetimeFigureOut">
               <a:rPr lang="en-US" smtClean="0"/>
-              <a:t>02/12/2017</a:t>
+              <a:t>04/12/2017</a:t>
             </a:fld>
             <a:endParaRPr lang="en-US"/>
           </a:p>
@@ -664,7 +669,7 @@
           <a:p>
             <a:fld id="{E27941F9-11D3-4E61-B86E-195AAB369534}" type="datetimeFigureOut">
               <a:rPr lang="en-US" smtClean="0"/>
-              <a:t>02/12/2017</a:t>
+              <a:t>04/12/2017</a:t>
             </a:fld>
             <a:endParaRPr lang="en-US"/>
           </a:p>
@@ -862,7 +867,7 @@
           <a:p>
             <a:fld id="{E27941F9-11D3-4E61-B86E-195AAB369534}" type="datetimeFigureOut">
               <a:rPr lang="en-US" smtClean="0"/>
-              <a:t>02/12/2017</a:t>
+              <a:t>04/12/2017</a:t>
             </a:fld>
             <a:endParaRPr lang="en-US"/>
           </a:p>
@@ -1137,7 +1142,7 @@
           <a:p>
             <a:fld id="{E27941F9-11D3-4E61-B86E-195AAB369534}" type="datetimeFigureOut">
               <a:rPr lang="en-US" smtClean="0"/>
-              <a:t>02/12/2017</a:t>
+              <a:t>04/12/2017</a:t>
             </a:fld>
             <a:endParaRPr lang="en-US"/>
           </a:p>
@@ -1402,7 +1407,7 @@
           <a:p>
             <a:fld id="{E27941F9-11D3-4E61-B86E-195AAB369534}" type="datetimeFigureOut">
               <a:rPr lang="en-US" smtClean="0"/>
-              <a:t>02/12/2017</a:t>
+              <a:t>04/12/2017</a:t>
             </a:fld>
             <a:endParaRPr lang="en-US"/>
           </a:p>
@@ -1814,7 +1819,7 @@
           <a:p>
             <a:fld id="{E27941F9-11D3-4E61-B86E-195AAB369534}" type="datetimeFigureOut">
               <a:rPr lang="en-US" smtClean="0"/>
-              <a:t>02/12/2017</a:t>
+              <a:t>04/12/2017</a:t>
             </a:fld>
             <a:endParaRPr lang="en-US"/>
           </a:p>
@@ -1955,7 +1960,7 @@
           <a:p>
             <a:fld id="{E27941F9-11D3-4E61-B86E-195AAB369534}" type="datetimeFigureOut">
               <a:rPr lang="en-US" smtClean="0"/>
-              <a:t>02/12/2017</a:t>
+              <a:t>04/12/2017</a:t>
             </a:fld>
             <a:endParaRPr lang="en-US"/>
           </a:p>
@@ -2068,7 +2073,7 @@
           <a:p>
             <a:fld id="{E27941F9-11D3-4E61-B86E-195AAB369534}" type="datetimeFigureOut">
               <a:rPr lang="en-US" smtClean="0"/>
-              <a:t>02/12/2017</a:t>
+              <a:t>04/12/2017</a:t>
             </a:fld>
             <a:endParaRPr lang="en-US"/>
           </a:p>
@@ -2379,7 +2384,7 @@
           <a:p>
             <a:fld id="{E27941F9-11D3-4E61-B86E-195AAB369534}" type="datetimeFigureOut">
               <a:rPr lang="en-US" smtClean="0"/>
-              <a:t>02/12/2017</a:t>
+              <a:t>04/12/2017</a:t>
             </a:fld>
             <a:endParaRPr lang="en-US"/>
           </a:p>
@@ -2667,7 +2672,7 @@
           <a:p>
             <a:fld id="{E27941F9-11D3-4E61-B86E-195AAB369534}" type="datetimeFigureOut">
               <a:rPr lang="en-US" smtClean="0"/>
-              <a:t>02/12/2017</a:t>
+              <a:t>04/12/2017</a:t>
             </a:fld>
             <a:endParaRPr lang="en-US"/>
           </a:p>
@@ -2908,7 +2913,7 @@
           <a:p>
             <a:fld id="{E27941F9-11D3-4E61-B86E-195AAB369534}" type="datetimeFigureOut">
               <a:rPr lang="en-US" smtClean="0"/>
-              <a:t>02/12/2017</a:t>
+              <a:t>04/12/2017</a:t>
             </a:fld>
             <a:endParaRPr lang="en-US"/>
           </a:p>
@@ -3325,6 +3330,49 @@
           <a:chExt cx="0" cy="0"/>
         </a:xfrm>
       </p:grpSpPr>
+      <p:cxnSp>
+        <p:nvCxnSpPr>
+          <p:cNvPr id="30" name="Straight Connector 29">
+            <a:extLst>
+              <a:ext uri="{FF2B5EF4-FFF2-40B4-BE49-F238E27FC236}">
+                <a16:creationId xmlns:a16="http://schemas.microsoft.com/office/drawing/2014/main" id="{3B403644-D4ED-4AC6-B1C6-3A91BD8B9D99}"/>
+              </a:ext>
+            </a:extLst>
+          </p:cNvPr>
+          <p:cNvCxnSpPr/>
+          <p:nvPr/>
+        </p:nvCxnSpPr>
+        <p:spPr>
+          <a:xfrm>
+            <a:off x="6572817" y="2852177"/>
+            <a:ext cx="481648" cy="0"/>
+          </a:xfrm>
+          <a:prstGeom prst="line">
+            <a:avLst/>
+          </a:prstGeom>
+          <a:ln>
+            <a:solidFill>
+              <a:schemeClr val="bg1">
+                <a:lumMod val="85000"/>
+              </a:schemeClr>
+            </a:solidFill>
+          </a:ln>
+        </p:spPr>
+        <p:style>
+          <a:lnRef idx="1">
+            <a:schemeClr val="accent1"/>
+          </a:lnRef>
+          <a:fillRef idx="0">
+            <a:schemeClr val="accent1"/>
+          </a:fillRef>
+          <a:effectRef idx="0">
+            <a:schemeClr val="accent1"/>
+          </a:effectRef>
+          <a:fontRef idx="minor">
+            <a:schemeClr val="tx1"/>
+          </a:fontRef>
+        </p:style>
+      </p:cxnSp>
       <p:grpSp>
         <p:nvGrpSpPr>
           <p:cNvPr id="25" name="Group 24">
@@ -3339,7 +3387,7 @@
         </p:nvGrpSpPr>
         <p:grpSpPr>
           <a:xfrm>
-            <a:off x="5184098" y="2030939"/>
+            <a:off x="467132" y="614735"/>
             <a:ext cx="1946952" cy="2254359"/>
             <a:chOff x="5184098" y="2030939"/>
             <a:chExt cx="1946952" cy="2254359"/>
@@ -3756,6 +3804,460 @@
           </p:txBody>
         </p:sp>
       </p:grpSp>
+      <p:sp>
+        <p:nvSpPr>
+          <p:cNvPr id="2" name="Oval 1">
+            <a:extLst>
+              <a:ext uri="{FF2B5EF4-FFF2-40B4-BE49-F238E27FC236}">
+                <a16:creationId xmlns:a16="http://schemas.microsoft.com/office/drawing/2014/main" id="{2E3C9576-26CD-481D-9707-1A7079AA41B4}"/>
+              </a:ext>
+            </a:extLst>
+          </p:cNvPr>
+          <p:cNvSpPr/>
+          <p:nvPr/>
+        </p:nvSpPr>
+        <p:spPr>
+          <a:xfrm>
+            <a:off x="6428833" y="3429000"/>
+            <a:ext cx="274320" cy="274320"/>
+          </a:xfrm>
+          <a:prstGeom prst="ellipse">
+            <a:avLst/>
+          </a:prstGeom>
+          <a:noFill/>
+          <a:ln>
+            <a:solidFill>
+              <a:schemeClr val="tx1"/>
+            </a:solidFill>
+          </a:ln>
+        </p:spPr>
+        <p:style>
+          <a:lnRef idx="2">
+            <a:schemeClr val="accent1">
+              <a:shade val="50000"/>
+            </a:schemeClr>
+          </a:lnRef>
+          <a:fillRef idx="1">
+            <a:schemeClr val="accent1"/>
+          </a:fillRef>
+          <a:effectRef idx="0">
+            <a:schemeClr val="accent1"/>
+          </a:effectRef>
+          <a:fontRef idx="minor">
+            <a:schemeClr val="lt1"/>
+          </a:fontRef>
+        </p:style>
+        <p:txBody>
+          <a:bodyPr rtlCol="0" anchor="ctr"/>
+          <a:lstStyle/>
+          <a:p>
+            <a:pPr algn="ctr"/>
+            <a:endParaRPr lang="en-US"/>
+          </a:p>
+        </p:txBody>
+      </p:sp>
+      <p:cxnSp>
+        <p:nvCxnSpPr>
+          <p:cNvPr id="6" name="Straight Connector 5">
+            <a:extLst>
+              <a:ext uri="{FF2B5EF4-FFF2-40B4-BE49-F238E27FC236}">
+                <a16:creationId xmlns:a16="http://schemas.microsoft.com/office/drawing/2014/main" id="{0033F6BC-2698-40C4-B4E5-28CB52CB86E0}"/>
+              </a:ext>
+            </a:extLst>
+          </p:cNvPr>
+          <p:cNvCxnSpPr>
+            <a:cxnSpLocks/>
+            <a:stCxn id="2" idx="4"/>
+          </p:cNvCxnSpPr>
+          <p:nvPr/>
+        </p:nvCxnSpPr>
+        <p:spPr>
+          <a:xfrm flipV="1">
+            <a:off x="6565993" y="2740025"/>
+            <a:ext cx="0" cy="963295"/>
+          </a:xfrm>
+          <a:prstGeom prst="line">
+            <a:avLst/>
+          </a:prstGeom>
+          <a:ln w="38100">
+            <a:solidFill>
+              <a:schemeClr val="tx1"/>
+            </a:solidFill>
+          </a:ln>
+        </p:spPr>
+        <p:style>
+          <a:lnRef idx="1">
+            <a:schemeClr val="accent1"/>
+          </a:lnRef>
+          <a:fillRef idx="0">
+            <a:schemeClr val="accent1"/>
+          </a:fillRef>
+          <a:effectRef idx="0">
+            <a:schemeClr val="accent1"/>
+          </a:effectRef>
+          <a:fontRef idx="minor">
+            <a:schemeClr val="tx1"/>
+          </a:fontRef>
+        </p:style>
+      </p:cxnSp>
+      <p:grpSp>
+        <p:nvGrpSpPr>
+          <p:cNvPr id="12" name="Group 11">
+            <a:extLst>
+              <a:ext uri="{FF2B5EF4-FFF2-40B4-BE49-F238E27FC236}">
+                <a16:creationId xmlns:a16="http://schemas.microsoft.com/office/drawing/2014/main" id="{A4994CE3-8D76-4482-AC47-6A023C906BBA}"/>
+              </a:ext>
+            </a:extLst>
+          </p:cNvPr>
+          <p:cNvGrpSpPr/>
+          <p:nvPr/>
+        </p:nvGrpSpPr>
+        <p:grpSpPr>
+          <a:xfrm rot="1800000">
+            <a:off x="6676481" y="2787649"/>
+            <a:ext cx="274320" cy="963295"/>
+            <a:chOff x="6581233" y="2892425"/>
+            <a:chExt cx="274320" cy="963295"/>
+          </a:xfrm>
+        </p:grpSpPr>
+        <p:sp>
+          <p:nvSpPr>
+            <p:cNvPr id="26" name="Oval 25">
+              <a:extLst>
+                <a:ext uri="{FF2B5EF4-FFF2-40B4-BE49-F238E27FC236}">
+                  <a16:creationId xmlns:a16="http://schemas.microsoft.com/office/drawing/2014/main" id="{9A990F2A-7D81-43F5-8087-3F1F1EB2806F}"/>
+                </a:ext>
+              </a:extLst>
+            </p:cNvPr>
+            <p:cNvSpPr/>
+            <p:nvPr/>
+          </p:nvSpPr>
+          <p:spPr>
+            <a:xfrm>
+              <a:off x="6581233" y="3581400"/>
+              <a:ext cx="274320" cy="274320"/>
+            </a:xfrm>
+            <a:prstGeom prst="ellipse">
+              <a:avLst/>
+            </a:prstGeom>
+            <a:noFill/>
+            <a:ln>
+              <a:solidFill>
+                <a:schemeClr val="tx1"/>
+              </a:solidFill>
+            </a:ln>
+          </p:spPr>
+          <p:style>
+            <a:lnRef idx="2">
+              <a:schemeClr val="accent1">
+                <a:shade val="50000"/>
+              </a:schemeClr>
+            </a:lnRef>
+            <a:fillRef idx="1">
+              <a:schemeClr val="accent1"/>
+            </a:fillRef>
+            <a:effectRef idx="0">
+              <a:schemeClr val="accent1"/>
+            </a:effectRef>
+            <a:fontRef idx="minor">
+              <a:schemeClr val="lt1"/>
+            </a:fontRef>
+          </p:style>
+          <p:txBody>
+            <a:bodyPr rtlCol="0" anchor="ctr"/>
+            <a:lstStyle/>
+            <a:p>
+              <a:pPr algn="ctr"/>
+              <a:endParaRPr lang="en-US"/>
+            </a:p>
+          </p:txBody>
+        </p:sp>
+        <p:cxnSp>
+          <p:nvCxnSpPr>
+            <p:cNvPr id="27" name="Straight Connector 26">
+              <a:extLst>
+                <a:ext uri="{FF2B5EF4-FFF2-40B4-BE49-F238E27FC236}">
+                  <a16:creationId xmlns:a16="http://schemas.microsoft.com/office/drawing/2014/main" id="{F88BEE53-FB82-4FE4-A0C3-3AB3F60F6FF1}"/>
+                </a:ext>
+              </a:extLst>
+            </p:cNvPr>
+            <p:cNvCxnSpPr>
+              <a:cxnSpLocks/>
+              <a:stCxn id="26" idx="4"/>
+            </p:cNvCxnSpPr>
+            <p:nvPr/>
+          </p:nvCxnSpPr>
+          <p:spPr>
+            <a:xfrm flipV="1">
+              <a:off x="6718393" y="2892425"/>
+              <a:ext cx="0" cy="963295"/>
+            </a:xfrm>
+            <a:prstGeom prst="line">
+              <a:avLst/>
+            </a:prstGeom>
+            <a:ln w="38100">
+              <a:solidFill>
+                <a:schemeClr val="tx1"/>
+              </a:solidFill>
+            </a:ln>
+          </p:spPr>
+          <p:style>
+            <a:lnRef idx="1">
+              <a:schemeClr val="accent1"/>
+            </a:lnRef>
+            <a:fillRef idx="0">
+              <a:schemeClr val="accent1"/>
+            </a:fillRef>
+            <a:effectRef idx="0">
+              <a:schemeClr val="accent1"/>
+            </a:effectRef>
+            <a:fontRef idx="minor">
+              <a:schemeClr val="tx1"/>
+            </a:fontRef>
+          </p:style>
+        </p:cxnSp>
+      </p:grpSp>
+      <p:sp>
+        <p:nvSpPr>
+          <p:cNvPr id="13" name="Arc 12">
+            <a:extLst>
+              <a:ext uri="{FF2B5EF4-FFF2-40B4-BE49-F238E27FC236}">
+                <a16:creationId xmlns:a16="http://schemas.microsoft.com/office/drawing/2014/main" id="{C579A498-B506-45DE-95FF-D4711BDA915A}"/>
+              </a:ext>
+            </a:extLst>
+          </p:cNvPr>
+          <p:cNvSpPr/>
+          <p:nvPr/>
+        </p:nvSpPr>
+        <p:spPr>
+          <a:xfrm rot="19928212">
+            <a:off x="6453847" y="3030535"/>
+            <a:ext cx="457200" cy="457200"/>
+          </a:xfrm>
+          <a:prstGeom prst="arc">
+            <a:avLst/>
+          </a:prstGeom>
+          <a:ln>
+            <a:solidFill>
+              <a:schemeClr val="tx1"/>
+            </a:solidFill>
+          </a:ln>
+        </p:spPr>
+        <p:style>
+          <a:lnRef idx="1">
+            <a:schemeClr val="accent1"/>
+          </a:lnRef>
+          <a:fillRef idx="0">
+            <a:schemeClr val="accent1"/>
+          </a:fillRef>
+          <a:effectRef idx="0">
+            <a:schemeClr val="accent1"/>
+          </a:effectRef>
+          <a:fontRef idx="minor">
+            <a:schemeClr val="tx1"/>
+          </a:fontRef>
+        </p:style>
+        <p:txBody>
+          <a:bodyPr rtlCol="0" anchor="ctr"/>
+          <a:lstStyle/>
+          <a:p>
+            <a:pPr algn="ctr"/>
+            <a:endParaRPr lang="en-US"/>
+          </a:p>
+        </p:txBody>
+      </p:sp>
+      <mc:AlternateContent xmlns:mc="http://schemas.openxmlformats.org/markup-compatibility/2006">
+        <mc:Choice xmlns:a14="http://schemas.microsoft.com/office/drawing/2010/main" Requires="a14">
+          <p:sp>
+            <p:nvSpPr>
+              <p:cNvPr id="28" name="TextBox 27">
+                <a:extLst>
+                  <a:ext uri="{FF2B5EF4-FFF2-40B4-BE49-F238E27FC236}">
+                    <a16:creationId xmlns:a16="http://schemas.microsoft.com/office/drawing/2014/main" id="{54270BEC-4B9B-4AC3-ACAE-0702306BE54A}"/>
+                  </a:ext>
+                </a:extLst>
+              </p:cNvPr>
+              <p:cNvSpPr txBox="1"/>
+              <p:nvPr/>
+            </p:nvSpPr>
+            <p:spPr>
+              <a:xfrm>
+                <a:off x="6874179" y="3130796"/>
+                <a:ext cx="132344" cy="276999"/>
+              </a:xfrm>
+              <a:prstGeom prst="rect">
+                <a:avLst/>
+              </a:prstGeom>
+              <a:noFill/>
+            </p:spPr>
+            <p:txBody>
+              <a:bodyPr wrap="square" lIns="0" tIns="0" rIns="0" bIns="0" rtlCol="0">
+                <a:spAutoFit/>
+              </a:bodyPr>
+              <a:lstStyle/>
+              <a:p>
+                <a14:m>
+                  <m:oMathPara xmlns:m="http://schemas.openxmlformats.org/officeDocument/2006/math">
+                    <m:oMathParaPr>
+                      <m:jc m:val="centerGroup"/>
+                    </m:oMathParaPr>
+                    <m:oMath xmlns:m="http://schemas.openxmlformats.org/officeDocument/2006/math">
+                      <m:r>
+                        <a:rPr lang="en-US" b="0" i="1" smtClean="0">
+                          <a:latin typeface="Cambria Math" panose="02040503050406030204" pitchFamily="18" charset="0"/>
+                          <a:ea typeface="Cambria Math" panose="02040503050406030204" pitchFamily="18" charset="0"/>
+                        </a:rPr>
+                        <m:t>𝑙</m:t>
+                      </m:r>
+                    </m:oMath>
+                  </m:oMathPara>
+                </a14:m>
+                <a:endParaRPr lang="en-US" dirty="0"/>
+              </a:p>
+            </p:txBody>
+          </p:sp>
+        </mc:Choice>
+        <mc:Fallback>
+          <p:sp>
+            <p:nvSpPr>
+              <p:cNvPr id="28" name="TextBox 27">
+                <a:extLst>
+                  <a:ext uri="{FF2B5EF4-FFF2-40B4-BE49-F238E27FC236}">
+                    <a16:creationId xmlns:a16="http://schemas.microsoft.com/office/drawing/2014/main" id="{54270BEC-4B9B-4AC3-ACAE-0702306BE54A}"/>
+                  </a:ext>
+                </a:extLst>
+              </p:cNvPr>
+              <p:cNvSpPr txBox="1">
+                <a:spLocks noRot="1" noChangeAspect="1" noMove="1" noResize="1" noEditPoints="1" noAdjustHandles="1" noChangeArrowheads="1" noChangeShapeType="1" noTextEdit="1"/>
+              </p:cNvSpPr>
+              <p:nvPr/>
+            </p:nvSpPr>
+            <p:spPr>
+              <a:xfrm>
+                <a:off x="6874179" y="3130796"/>
+                <a:ext cx="132344" cy="276999"/>
+              </a:xfrm>
+              <a:prstGeom prst="rect">
+                <a:avLst/>
+              </a:prstGeom>
+              <a:blipFill>
+                <a:blip r:embed="rId2"/>
+                <a:stretch>
+                  <a:fillRect l="-47619" r="-42857" b="-8889"/>
+                </a:stretch>
+              </a:blipFill>
+            </p:spPr>
+            <p:txBody>
+              <a:bodyPr/>
+              <a:lstStyle/>
+              <a:p>
+                <a:r>
+                  <a:rPr lang="en-US">
+                    <a:noFill/>
+                  </a:rPr>
+                  <a:t> </a:t>
+                </a:r>
+              </a:p>
+            </p:txBody>
+          </p:sp>
+        </mc:Fallback>
+      </mc:AlternateContent>
+      <mc:AlternateContent xmlns:mc="http://schemas.openxmlformats.org/markup-compatibility/2006">
+        <mc:Choice xmlns:a14="http://schemas.microsoft.com/office/drawing/2010/main" Requires="a14">
+          <p:sp>
+            <p:nvSpPr>
+              <p:cNvPr id="29" name="TextBox 28">
+                <a:extLst>
+                  <a:ext uri="{FF2B5EF4-FFF2-40B4-BE49-F238E27FC236}">
+                    <a16:creationId xmlns:a16="http://schemas.microsoft.com/office/drawing/2014/main" id="{B3100F2F-C512-464D-BD24-5082FAF83D00}"/>
+                  </a:ext>
+                </a:extLst>
+              </p:cNvPr>
+              <p:cNvSpPr txBox="1"/>
+              <p:nvPr/>
+            </p:nvSpPr>
+            <p:spPr>
+              <a:xfrm>
+                <a:off x="6385707" y="2935792"/>
+                <a:ext cx="132344" cy="276999"/>
+              </a:xfrm>
+              <a:prstGeom prst="rect">
+                <a:avLst/>
+              </a:prstGeom>
+              <a:noFill/>
+            </p:spPr>
+            <p:txBody>
+              <a:bodyPr wrap="square" lIns="0" tIns="0" rIns="0" bIns="0" rtlCol="0">
+                <a:spAutoFit/>
+              </a:bodyPr>
+              <a:lstStyle/>
+              <a:p>
+                <a14:m>
+                  <m:oMathPara xmlns:m="http://schemas.openxmlformats.org/officeDocument/2006/math">
+                    <m:oMathParaPr>
+                      <m:jc m:val="centerGroup"/>
+                    </m:oMathParaPr>
+                    <m:oMath xmlns:m="http://schemas.openxmlformats.org/officeDocument/2006/math">
+                      <m:r>
+                        <a:rPr lang="en-US" b="0" i="1" smtClean="0">
+                          <a:latin typeface="Cambria Math" panose="02040503050406030204" pitchFamily="18" charset="0"/>
+                          <a:ea typeface="Cambria Math" panose="02040503050406030204" pitchFamily="18" charset="0"/>
+                        </a:rPr>
+                        <m:t>𝑙</m:t>
+                      </m:r>
+                    </m:oMath>
+                  </m:oMathPara>
+                </a14:m>
+                <a:endParaRPr lang="en-US" dirty="0"/>
+              </a:p>
+            </p:txBody>
+          </p:sp>
+        </mc:Choice>
+        <mc:Fallback>
+          <p:sp>
+            <p:nvSpPr>
+              <p:cNvPr id="29" name="TextBox 28">
+                <a:extLst>
+                  <a:ext uri="{FF2B5EF4-FFF2-40B4-BE49-F238E27FC236}">
+                    <a16:creationId xmlns:a16="http://schemas.microsoft.com/office/drawing/2014/main" id="{B3100F2F-C512-464D-BD24-5082FAF83D00}"/>
+                  </a:ext>
+                </a:extLst>
+              </p:cNvPr>
+              <p:cNvSpPr txBox="1">
+                <a:spLocks noRot="1" noChangeAspect="1" noMove="1" noResize="1" noEditPoints="1" noAdjustHandles="1" noChangeArrowheads="1" noChangeShapeType="1" noTextEdit="1"/>
+              </p:cNvSpPr>
+              <p:nvPr/>
+            </p:nvSpPr>
+            <p:spPr>
+              <a:xfrm>
+                <a:off x="6385707" y="2935792"/>
+                <a:ext cx="132344" cy="276999"/>
+              </a:xfrm>
+              <a:prstGeom prst="rect">
+                <a:avLst/>
+              </a:prstGeom>
+              <a:blipFill>
+                <a:blip r:embed="rId3"/>
+                <a:stretch>
+                  <a:fillRect l="-47619" r="-42857" b="-8889"/>
+                </a:stretch>
+              </a:blipFill>
+            </p:spPr>
+            <p:txBody>
+              <a:bodyPr/>
+              <a:lstStyle/>
+              <a:p>
+                <a:r>
+                  <a:rPr lang="en-US">
+                    <a:noFill/>
+                  </a:rPr>
+                  <a:t> </a:t>
+                </a:r>
+              </a:p>
+            </p:txBody>
+          </p:sp>
+        </mc:Fallback>
+      </mc:AlternateContent>
     </p:spTree>
     <p:extLst>
       <p:ext uri="{BB962C8B-B14F-4D97-AF65-F5344CB8AC3E}">

</xml_diff>